<commit_message>
Docker Terminal mode and GUI mode
1. Docker Terminal mode: Qocker Quickstart Terminal
2. Docker GUI Mode: Kitematic with PowerShell
</commit_message>
<xml_diff>
--- a/05_DockerHub01.pptx
+++ b/05_DockerHub01.pptx
@@ -4591,36 +4591,6 @@
       </p:sp>
       <p:sp>
         <p:nvSpPr>
-          <p:cNvPr id="3" name="副標題 2"/>
-          <p:cNvSpPr>
-            <a:spLocks noGrp="1"/>
-          </p:cNvSpPr>
-          <p:nvPr>
-            <p:ph type="subTitle" idx="1"/>
-          </p:nvPr>
-        </p:nvSpPr>
-        <p:spPr>
-          <a:xfrm>
-            <a:off x="1259632" y="4581128"/>
-            <a:ext cx="6400800" cy="694928"/>
-          </a:xfrm>
-        </p:spPr>
-        <p:txBody>
-          <a:bodyPr>
-            <a:normAutofit/>
-          </a:bodyPr>
-          <a:lstStyle/>
-          <a:p>
-            <a:r>
-              <a:rPr lang="en-US" altLang="zh-TW" dirty="0"/>
-              <a:t>Peter H. Chen</a:t>
-            </a:r>
-            <a:endParaRPr lang="zh-TW" altLang="en-US" dirty="0"/>
-          </a:p>
-        </p:txBody>
-      </p:sp>
-      <p:sp>
-        <p:nvSpPr>
           <p:cNvPr id="5" name="日期版面配置區 4"/>
           <p:cNvSpPr>
             <a:spLocks noGrp="1"/>
@@ -5413,36 +5383,6 @@
                 <a:srgbClr val="FFFF00"/>
               </a:solidFill>
             </a:endParaRPr>
-          </a:p>
-        </p:txBody>
-      </p:sp>
-      <p:sp>
-        <p:nvSpPr>
-          <p:cNvPr id="3" name="副標題 2"/>
-          <p:cNvSpPr>
-            <a:spLocks noGrp="1"/>
-          </p:cNvSpPr>
-          <p:nvPr>
-            <p:ph type="subTitle" idx="1"/>
-          </p:nvPr>
-        </p:nvSpPr>
-        <p:spPr>
-          <a:xfrm>
-            <a:off x="1259632" y="4581128"/>
-            <a:ext cx="6400800" cy="694928"/>
-          </a:xfrm>
-        </p:spPr>
-        <p:txBody>
-          <a:bodyPr>
-            <a:normAutofit/>
-          </a:bodyPr>
-          <a:lstStyle/>
-          <a:p>
-            <a:r>
-              <a:rPr lang="en-US" altLang="zh-TW" dirty="0"/>
-              <a:t>Peter H. Chen</a:t>
-            </a:r>
-            <a:endParaRPr lang="zh-TW" altLang="en-US" dirty="0"/>
           </a:p>
         </p:txBody>
       </p:sp>
@@ -6276,36 +6216,6 @@
                 <a:srgbClr val="FFFF00"/>
               </a:solidFill>
             </a:endParaRPr>
-          </a:p>
-        </p:txBody>
-      </p:sp>
-      <p:sp>
-        <p:nvSpPr>
-          <p:cNvPr id="3" name="副標題 2"/>
-          <p:cNvSpPr>
-            <a:spLocks noGrp="1"/>
-          </p:cNvSpPr>
-          <p:nvPr>
-            <p:ph type="subTitle" idx="1"/>
-          </p:nvPr>
-        </p:nvSpPr>
-        <p:spPr>
-          <a:xfrm>
-            <a:off x="1259632" y="4581128"/>
-            <a:ext cx="6400800" cy="694928"/>
-          </a:xfrm>
-        </p:spPr>
-        <p:txBody>
-          <a:bodyPr>
-            <a:normAutofit/>
-          </a:bodyPr>
-          <a:lstStyle/>
-          <a:p>
-            <a:r>
-              <a:rPr lang="en-US" altLang="zh-TW" dirty="0"/>
-              <a:t>Peter H. Chen</a:t>
-            </a:r>
-            <a:endParaRPr lang="zh-TW" altLang="en-US" dirty="0"/>
           </a:p>
         </p:txBody>
       </p:sp>

</xml_diff>